<commit_message>
modificação nas figuras (e3value...)
</commit_message>
<xml_diff>
--- a/JournalToSubmit2013/figs/piSOD-M_process.pptx
+++ b/JournalToSubmit2013/figs/piSOD-M_process.pptx
@@ -9992,7 +9992,23 @@
                   <a:cs typeface="Consolas"/>
                   <a:sym typeface="Symbol" charset="0"/>
                 </a:rPr>
-                <a:t>E3-value</a:t>
+                <a:t>e</a:t>
+              </a:r>
+              <a:r>
+                <a:rPr lang="en-GB" sz="1200" baseline="30000" dirty="0" smtClean="0">
+                  <a:latin typeface="Consolas"/>
+                  <a:cs typeface="Consolas"/>
+                  <a:sym typeface="Symbol" charset="0"/>
+                </a:rPr>
+                <a:t>3</a:t>
+              </a:r>
+              <a:r>
+                <a:rPr lang="en-GB" sz="1200" dirty="0" smtClean="0">
+                  <a:latin typeface="Consolas"/>
+                  <a:cs typeface="Consolas"/>
+                  <a:sym typeface="Symbol" charset="0"/>
+                </a:rPr>
+                <a:t>value</a:t>
               </a:r>
               <a:endParaRPr lang="en-GB" sz="1200" dirty="0" smtClean="0">
                 <a:latin typeface="Consolas"/>
@@ -10828,7 +10844,23 @@
                   <a:cs typeface="Consolas"/>
                   <a:sym typeface="Symbol" charset="0"/>
                 </a:rPr>
-                <a:t>E3-value</a:t>
+                <a:t>e</a:t>
+              </a:r>
+              <a:r>
+                <a:rPr lang="en-GB" sz="1100" baseline="30000" dirty="0" smtClean="0">
+                  <a:latin typeface="Consolas"/>
+                  <a:cs typeface="Consolas"/>
+                  <a:sym typeface="Symbol" charset="0"/>
+                </a:rPr>
+                <a:t>3</a:t>
+              </a:r>
+              <a:r>
+                <a:rPr lang="en-GB" sz="1100" dirty="0" smtClean="0">
+                  <a:latin typeface="Consolas"/>
+                  <a:cs typeface="Consolas"/>
+                  <a:sym typeface="Symbol" charset="0"/>
+                </a:rPr>
+                <a:t>value</a:t>
               </a:r>
               <a:endParaRPr lang="en-GB" sz="1100" dirty="0" smtClean="0">
                 <a:latin typeface="Consolas"/>

</xml_diff>

<commit_message>
Answers for Martin and Umberto.
</commit_message>
<xml_diff>
--- a/JournalToSubmit2013/figs/piSOD-M_process.pptx
+++ b/JournalToSubmit2013/figs/piSOD-M_process.pptx
@@ -288,7 +288,7 @@
           <a:p>
             <a:fld id="{32211098-EE3A-854A-BDC0-4ED66CEC599D}" type="datetimeFigureOut">
               <a:rPr lang="pt-BR" smtClean="0"/>
-              <a:t>12/02/14</a:t>
+              <a:t>06/04/14</a:t>
             </a:fld>
             <a:endParaRPr lang="pt-BR"/>
           </a:p>
@@ -453,7 +453,7 @@
           <a:p>
             <a:fld id="{32211098-EE3A-854A-BDC0-4ED66CEC599D}" type="datetimeFigureOut">
               <a:rPr lang="pt-BR" smtClean="0"/>
-              <a:t>12/02/14</a:t>
+              <a:t>06/04/14</a:t>
             </a:fld>
             <a:endParaRPr lang="pt-BR"/>
           </a:p>
@@ -628,7 +628,7 @@
           <a:p>
             <a:fld id="{32211098-EE3A-854A-BDC0-4ED66CEC599D}" type="datetimeFigureOut">
               <a:rPr lang="pt-BR" smtClean="0"/>
-              <a:t>12/02/14</a:t>
+              <a:t>06/04/14</a:t>
             </a:fld>
             <a:endParaRPr lang="pt-BR"/>
           </a:p>
@@ -793,7 +793,7 @@
           <a:p>
             <a:fld id="{32211098-EE3A-854A-BDC0-4ED66CEC599D}" type="datetimeFigureOut">
               <a:rPr lang="pt-BR" smtClean="0"/>
-              <a:t>12/02/14</a:t>
+              <a:t>06/04/14</a:t>
             </a:fld>
             <a:endParaRPr lang="pt-BR"/>
           </a:p>
@@ -1034,7 +1034,7 @@
           <a:p>
             <a:fld id="{32211098-EE3A-854A-BDC0-4ED66CEC599D}" type="datetimeFigureOut">
               <a:rPr lang="pt-BR" smtClean="0"/>
-              <a:t>12/02/14</a:t>
+              <a:t>06/04/14</a:t>
             </a:fld>
             <a:endParaRPr lang="pt-BR"/>
           </a:p>
@@ -1317,7 +1317,7 @@
           <a:p>
             <a:fld id="{32211098-EE3A-854A-BDC0-4ED66CEC599D}" type="datetimeFigureOut">
               <a:rPr lang="pt-BR" smtClean="0"/>
-              <a:t>12/02/14</a:t>
+              <a:t>06/04/14</a:t>
             </a:fld>
             <a:endParaRPr lang="pt-BR"/>
           </a:p>
@@ -1734,7 +1734,7 @@
           <a:p>
             <a:fld id="{32211098-EE3A-854A-BDC0-4ED66CEC599D}" type="datetimeFigureOut">
               <a:rPr lang="pt-BR" smtClean="0"/>
-              <a:t>12/02/14</a:t>
+              <a:t>06/04/14</a:t>
             </a:fld>
             <a:endParaRPr lang="pt-BR"/>
           </a:p>
@@ -1847,7 +1847,7 @@
           <a:p>
             <a:fld id="{32211098-EE3A-854A-BDC0-4ED66CEC599D}" type="datetimeFigureOut">
               <a:rPr lang="pt-BR" smtClean="0"/>
-              <a:t>12/02/14</a:t>
+              <a:t>06/04/14</a:t>
             </a:fld>
             <a:endParaRPr lang="pt-BR"/>
           </a:p>
@@ -1937,7 +1937,7 @@
           <a:p>
             <a:fld id="{32211098-EE3A-854A-BDC0-4ED66CEC599D}" type="datetimeFigureOut">
               <a:rPr lang="pt-BR" smtClean="0"/>
-              <a:t>12/02/14</a:t>
+              <a:t>06/04/14</a:t>
             </a:fld>
             <a:endParaRPr lang="pt-BR"/>
           </a:p>
@@ -2209,7 +2209,7 @@
           <a:p>
             <a:fld id="{32211098-EE3A-854A-BDC0-4ED66CEC599D}" type="datetimeFigureOut">
               <a:rPr lang="pt-BR" smtClean="0"/>
-              <a:t>12/02/14</a:t>
+              <a:t>06/04/14</a:t>
             </a:fld>
             <a:endParaRPr lang="pt-BR"/>
           </a:p>
@@ -2457,7 +2457,7 @@
           <a:p>
             <a:fld id="{32211098-EE3A-854A-BDC0-4ED66CEC599D}" type="datetimeFigureOut">
               <a:rPr lang="pt-BR" smtClean="0"/>
-              <a:t>12/02/14</a:t>
+              <a:t>06/04/14</a:t>
             </a:fld>
             <a:endParaRPr lang="pt-BR"/>
           </a:p>
@@ -2665,7 +2665,7 @@
           <a:p>
             <a:fld id="{32211098-EE3A-854A-BDC0-4ED66CEC599D}" type="datetimeFigureOut">
               <a:rPr lang="pt-BR" smtClean="0"/>
-              <a:t>12/02/14</a:t>
+              <a:t>06/04/14</a:t>
             </a:fld>
             <a:endParaRPr lang="pt-BR"/>
           </a:p>
@@ -3037,839 +3037,6 @@
       </p:grpSpPr>
       <p:sp>
         <p:nvSpPr>
-          <p:cNvPr id="126" name="AutoShape 21"/>
-          <p:cNvSpPr>
-            <a:spLocks noChangeArrowheads="1"/>
-          </p:cNvSpPr>
-          <p:nvPr/>
-        </p:nvSpPr>
-        <p:spPr bwMode="auto">
-          <a:xfrm>
-            <a:off x="6250585" y="2528933"/>
-            <a:ext cx="515309" cy="215404"/>
-          </a:xfrm>
-          <a:prstGeom prst="downArrow">
-            <a:avLst>
-              <a:gd name="adj1" fmla="val 49778"/>
-              <a:gd name="adj2" fmla="val 39009"/>
-            </a:avLst>
-          </a:prstGeom>
-          <a:solidFill>
-            <a:schemeClr val="accent3">
-              <a:lumMod val="50000"/>
-            </a:schemeClr>
-          </a:solidFill>
-          <a:ln>
-            <a:solidFill>
-              <a:schemeClr val="accent3">
-                <a:lumMod val="60000"/>
-                <a:lumOff val="40000"/>
-              </a:schemeClr>
-            </a:solidFill>
-            <a:headEnd/>
-            <a:tailEnd/>
-          </a:ln>
-          <a:extLst/>
-        </p:spPr>
-        <p:style>
-          <a:lnRef idx="1">
-            <a:schemeClr val="accent4"/>
-          </a:lnRef>
-          <a:fillRef idx="2">
-            <a:schemeClr val="accent4"/>
-          </a:fillRef>
-          <a:effectRef idx="1">
-            <a:schemeClr val="accent4"/>
-          </a:effectRef>
-          <a:fontRef idx="minor">
-            <a:schemeClr val="dk1"/>
-          </a:fontRef>
-        </p:style>
-        <p:txBody>
-          <a:bodyPr wrap="none" anchor="ctr"/>
-          <a:lstStyle>
-            <a:defPPr>
-              <a:defRPr lang="es-ES"/>
-            </a:defPPr>
-            <a:lvl1pPr algn="l" rtl="0" fontAlgn="base">
-              <a:spcBef>
-                <a:spcPct val="0"/>
-              </a:spcBef>
-              <a:spcAft>
-                <a:spcPct val="0"/>
-              </a:spcAft>
-              <a:defRPr kern="1200">
-                <a:solidFill>
-                  <a:schemeClr val="tx1"/>
-                </a:solidFill>
-                <a:latin typeface="Arial" charset="0"/>
-                <a:ea typeface="ＭＳ Ｐゴシック" charset="0"/>
-                <a:cs typeface="ＭＳ Ｐゴシック" charset="0"/>
-              </a:defRPr>
-            </a:lvl1pPr>
-            <a:lvl2pPr marL="457200" algn="l" rtl="0" fontAlgn="base">
-              <a:spcBef>
-                <a:spcPct val="0"/>
-              </a:spcBef>
-              <a:spcAft>
-                <a:spcPct val="0"/>
-              </a:spcAft>
-              <a:defRPr kern="1200">
-                <a:solidFill>
-                  <a:schemeClr val="tx1"/>
-                </a:solidFill>
-                <a:latin typeface="Arial" charset="0"/>
-                <a:ea typeface="ＭＳ Ｐゴシック" charset="0"/>
-                <a:cs typeface="ＭＳ Ｐゴシック" charset="0"/>
-              </a:defRPr>
-            </a:lvl2pPr>
-            <a:lvl3pPr marL="914400" algn="l" rtl="0" fontAlgn="base">
-              <a:spcBef>
-                <a:spcPct val="0"/>
-              </a:spcBef>
-              <a:spcAft>
-                <a:spcPct val="0"/>
-              </a:spcAft>
-              <a:defRPr kern="1200">
-                <a:solidFill>
-                  <a:schemeClr val="tx1"/>
-                </a:solidFill>
-                <a:latin typeface="Arial" charset="0"/>
-                <a:ea typeface="ＭＳ Ｐゴシック" charset="0"/>
-                <a:cs typeface="ＭＳ Ｐゴシック" charset="0"/>
-              </a:defRPr>
-            </a:lvl3pPr>
-            <a:lvl4pPr marL="1371600" algn="l" rtl="0" fontAlgn="base">
-              <a:spcBef>
-                <a:spcPct val="0"/>
-              </a:spcBef>
-              <a:spcAft>
-                <a:spcPct val="0"/>
-              </a:spcAft>
-              <a:defRPr kern="1200">
-                <a:solidFill>
-                  <a:schemeClr val="tx1"/>
-                </a:solidFill>
-                <a:latin typeface="Arial" charset="0"/>
-                <a:ea typeface="ＭＳ Ｐゴシック" charset="0"/>
-                <a:cs typeface="ＭＳ Ｐゴシック" charset="0"/>
-              </a:defRPr>
-            </a:lvl4pPr>
-            <a:lvl5pPr marL="1828800" algn="l" rtl="0" fontAlgn="base">
-              <a:spcBef>
-                <a:spcPct val="0"/>
-              </a:spcBef>
-              <a:spcAft>
-                <a:spcPct val="0"/>
-              </a:spcAft>
-              <a:defRPr kern="1200">
-                <a:solidFill>
-                  <a:schemeClr val="tx1"/>
-                </a:solidFill>
-                <a:latin typeface="Arial" charset="0"/>
-                <a:ea typeface="ＭＳ Ｐゴシック" charset="0"/>
-                <a:cs typeface="ＭＳ Ｐゴシック" charset="0"/>
-              </a:defRPr>
-            </a:lvl5pPr>
-            <a:lvl6pPr marL="2286000" algn="l" defTabSz="457200" rtl="0" eaLnBrk="1" latinLnBrk="0" hangingPunct="1">
-              <a:defRPr kern="1200">
-                <a:solidFill>
-                  <a:schemeClr val="tx1"/>
-                </a:solidFill>
-                <a:latin typeface="Arial" charset="0"/>
-                <a:ea typeface="ＭＳ Ｐゴシック" charset="0"/>
-                <a:cs typeface="ＭＳ Ｐゴシック" charset="0"/>
-              </a:defRPr>
-            </a:lvl6pPr>
-            <a:lvl7pPr marL="2743200" algn="l" defTabSz="457200" rtl="0" eaLnBrk="1" latinLnBrk="0" hangingPunct="1">
-              <a:defRPr kern="1200">
-                <a:solidFill>
-                  <a:schemeClr val="tx1"/>
-                </a:solidFill>
-                <a:latin typeface="Arial" charset="0"/>
-                <a:ea typeface="ＭＳ Ｐゴシック" charset="0"/>
-                <a:cs typeface="ＭＳ Ｐゴシック" charset="0"/>
-              </a:defRPr>
-            </a:lvl7pPr>
-            <a:lvl8pPr marL="3200400" algn="l" defTabSz="457200" rtl="0" eaLnBrk="1" latinLnBrk="0" hangingPunct="1">
-              <a:defRPr kern="1200">
-                <a:solidFill>
-                  <a:schemeClr val="tx1"/>
-                </a:solidFill>
-                <a:latin typeface="Arial" charset="0"/>
-                <a:ea typeface="ＭＳ Ｐゴシック" charset="0"/>
-                <a:cs typeface="ＭＳ Ｐゴシック" charset="0"/>
-              </a:defRPr>
-            </a:lvl8pPr>
-            <a:lvl9pPr marL="3657600" algn="l" defTabSz="457200" rtl="0" eaLnBrk="1" latinLnBrk="0" hangingPunct="1">
-              <a:defRPr kern="1200">
-                <a:solidFill>
-                  <a:schemeClr val="tx1"/>
-                </a:solidFill>
-                <a:latin typeface="Arial" charset="0"/>
-                <a:ea typeface="ＭＳ Ｐゴシック" charset="0"/>
-                <a:cs typeface="ＭＳ Ｐゴシック" charset="0"/>
-              </a:defRPr>
-            </a:lvl9pPr>
-          </a:lstStyle>
-          <a:p>
-            <a:pPr>
-              <a:defRPr/>
-            </a:pPr>
-            <a:endParaRPr lang="en-GB" sz="1100">
-              <a:cs typeface="+mn-cs"/>
-            </a:endParaRPr>
-          </a:p>
-        </p:txBody>
-      </p:sp>
-      <p:sp>
-        <p:nvSpPr>
-          <p:cNvPr id="127" name="AutoShape 21"/>
-          <p:cNvSpPr>
-            <a:spLocks noChangeArrowheads="1"/>
-          </p:cNvSpPr>
-          <p:nvPr/>
-        </p:nvSpPr>
-        <p:spPr bwMode="auto">
-          <a:xfrm>
-            <a:off x="6283410" y="3403018"/>
-            <a:ext cx="466169" cy="270967"/>
-          </a:xfrm>
-          <a:prstGeom prst="downArrow">
-            <a:avLst>
-              <a:gd name="adj1" fmla="val 49778"/>
-              <a:gd name="adj2" fmla="val 39009"/>
-            </a:avLst>
-          </a:prstGeom>
-          <a:solidFill>
-            <a:schemeClr val="accent3">
-              <a:lumMod val="50000"/>
-            </a:schemeClr>
-          </a:solidFill>
-          <a:ln>
-            <a:solidFill>
-              <a:schemeClr val="accent3">
-                <a:lumMod val="60000"/>
-                <a:lumOff val="40000"/>
-              </a:schemeClr>
-            </a:solidFill>
-            <a:headEnd/>
-            <a:tailEnd/>
-          </a:ln>
-          <a:extLst/>
-        </p:spPr>
-        <p:style>
-          <a:lnRef idx="1">
-            <a:schemeClr val="accent4"/>
-          </a:lnRef>
-          <a:fillRef idx="2">
-            <a:schemeClr val="accent4"/>
-          </a:fillRef>
-          <a:effectRef idx="1">
-            <a:schemeClr val="accent4"/>
-          </a:effectRef>
-          <a:fontRef idx="minor">
-            <a:schemeClr val="dk1"/>
-          </a:fontRef>
-        </p:style>
-        <p:txBody>
-          <a:bodyPr wrap="none" anchor="ctr"/>
-          <a:lstStyle>
-            <a:defPPr>
-              <a:defRPr lang="es-ES"/>
-            </a:defPPr>
-            <a:lvl1pPr algn="l" rtl="0" fontAlgn="base">
-              <a:spcBef>
-                <a:spcPct val="0"/>
-              </a:spcBef>
-              <a:spcAft>
-                <a:spcPct val="0"/>
-              </a:spcAft>
-              <a:defRPr kern="1200">
-                <a:solidFill>
-                  <a:schemeClr val="tx1"/>
-                </a:solidFill>
-                <a:latin typeface="Arial" charset="0"/>
-                <a:ea typeface="ＭＳ Ｐゴシック" charset="0"/>
-                <a:cs typeface="ＭＳ Ｐゴシック" charset="0"/>
-              </a:defRPr>
-            </a:lvl1pPr>
-            <a:lvl2pPr marL="457200" algn="l" rtl="0" fontAlgn="base">
-              <a:spcBef>
-                <a:spcPct val="0"/>
-              </a:spcBef>
-              <a:spcAft>
-                <a:spcPct val="0"/>
-              </a:spcAft>
-              <a:defRPr kern="1200">
-                <a:solidFill>
-                  <a:schemeClr val="tx1"/>
-                </a:solidFill>
-                <a:latin typeface="Arial" charset="0"/>
-                <a:ea typeface="ＭＳ Ｐゴシック" charset="0"/>
-                <a:cs typeface="ＭＳ Ｐゴシック" charset="0"/>
-              </a:defRPr>
-            </a:lvl2pPr>
-            <a:lvl3pPr marL="914400" algn="l" rtl="0" fontAlgn="base">
-              <a:spcBef>
-                <a:spcPct val="0"/>
-              </a:spcBef>
-              <a:spcAft>
-                <a:spcPct val="0"/>
-              </a:spcAft>
-              <a:defRPr kern="1200">
-                <a:solidFill>
-                  <a:schemeClr val="tx1"/>
-                </a:solidFill>
-                <a:latin typeface="Arial" charset="0"/>
-                <a:ea typeface="ＭＳ Ｐゴシック" charset="0"/>
-                <a:cs typeface="ＭＳ Ｐゴシック" charset="0"/>
-              </a:defRPr>
-            </a:lvl3pPr>
-            <a:lvl4pPr marL="1371600" algn="l" rtl="0" fontAlgn="base">
-              <a:spcBef>
-                <a:spcPct val="0"/>
-              </a:spcBef>
-              <a:spcAft>
-                <a:spcPct val="0"/>
-              </a:spcAft>
-              <a:defRPr kern="1200">
-                <a:solidFill>
-                  <a:schemeClr val="tx1"/>
-                </a:solidFill>
-                <a:latin typeface="Arial" charset="0"/>
-                <a:ea typeface="ＭＳ Ｐゴシック" charset="0"/>
-                <a:cs typeface="ＭＳ Ｐゴシック" charset="0"/>
-              </a:defRPr>
-            </a:lvl4pPr>
-            <a:lvl5pPr marL="1828800" algn="l" rtl="0" fontAlgn="base">
-              <a:spcBef>
-                <a:spcPct val="0"/>
-              </a:spcBef>
-              <a:spcAft>
-                <a:spcPct val="0"/>
-              </a:spcAft>
-              <a:defRPr kern="1200">
-                <a:solidFill>
-                  <a:schemeClr val="tx1"/>
-                </a:solidFill>
-                <a:latin typeface="Arial" charset="0"/>
-                <a:ea typeface="ＭＳ Ｐゴシック" charset="0"/>
-                <a:cs typeface="ＭＳ Ｐゴシック" charset="0"/>
-              </a:defRPr>
-            </a:lvl5pPr>
-            <a:lvl6pPr marL="2286000" algn="l" defTabSz="457200" rtl="0" eaLnBrk="1" latinLnBrk="0" hangingPunct="1">
-              <a:defRPr kern="1200">
-                <a:solidFill>
-                  <a:schemeClr val="tx1"/>
-                </a:solidFill>
-                <a:latin typeface="Arial" charset="0"/>
-                <a:ea typeface="ＭＳ Ｐゴシック" charset="0"/>
-                <a:cs typeface="ＭＳ Ｐゴシック" charset="0"/>
-              </a:defRPr>
-            </a:lvl6pPr>
-            <a:lvl7pPr marL="2743200" algn="l" defTabSz="457200" rtl="0" eaLnBrk="1" latinLnBrk="0" hangingPunct="1">
-              <a:defRPr kern="1200">
-                <a:solidFill>
-                  <a:schemeClr val="tx1"/>
-                </a:solidFill>
-                <a:latin typeface="Arial" charset="0"/>
-                <a:ea typeface="ＭＳ Ｐゴシック" charset="0"/>
-                <a:cs typeface="ＭＳ Ｐゴシック" charset="0"/>
-              </a:defRPr>
-            </a:lvl7pPr>
-            <a:lvl8pPr marL="3200400" algn="l" defTabSz="457200" rtl="0" eaLnBrk="1" latinLnBrk="0" hangingPunct="1">
-              <a:defRPr kern="1200">
-                <a:solidFill>
-                  <a:schemeClr val="tx1"/>
-                </a:solidFill>
-                <a:latin typeface="Arial" charset="0"/>
-                <a:ea typeface="ＭＳ Ｐゴシック" charset="0"/>
-                <a:cs typeface="ＭＳ Ｐゴシック" charset="0"/>
-              </a:defRPr>
-            </a:lvl8pPr>
-            <a:lvl9pPr marL="3657600" algn="l" defTabSz="457200" rtl="0" eaLnBrk="1" latinLnBrk="0" hangingPunct="1">
-              <a:defRPr kern="1200">
-                <a:solidFill>
-                  <a:schemeClr val="tx1"/>
-                </a:solidFill>
-                <a:latin typeface="Arial" charset="0"/>
-                <a:ea typeface="ＭＳ Ｐゴシック" charset="0"/>
-                <a:cs typeface="ＭＳ Ｐゴシック" charset="0"/>
-              </a:defRPr>
-            </a:lvl9pPr>
-          </a:lstStyle>
-          <a:p>
-            <a:pPr>
-              <a:defRPr/>
-            </a:pPr>
-            <a:endParaRPr lang="en-GB" sz="1100">
-              <a:cs typeface="+mn-cs"/>
-            </a:endParaRPr>
-          </a:p>
-        </p:txBody>
-      </p:sp>
-      <p:sp>
-        <p:nvSpPr>
-          <p:cNvPr id="128" name="AutoShape 21"/>
-          <p:cNvSpPr>
-            <a:spLocks noChangeArrowheads="1"/>
-          </p:cNvSpPr>
-          <p:nvPr/>
-        </p:nvSpPr>
-        <p:spPr bwMode="auto">
-          <a:xfrm>
-            <a:off x="6345107" y="4298528"/>
-            <a:ext cx="399339" cy="512262"/>
-          </a:xfrm>
-          <a:prstGeom prst="downArrow">
-            <a:avLst>
-              <a:gd name="adj1" fmla="val 49778"/>
-              <a:gd name="adj2" fmla="val 39009"/>
-            </a:avLst>
-          </a:prstGeom>
-          <a:solidFill>
-            <a:schemeClr val="accent3">
-              <a:lumMod val="50000"/>
-            </a:schemeClr>
-          </a:solidFill>
-          <a:ln>
-            <a:solidFill>
-              <a:schemeClr val="accent3">
-                <a:lumMod val="60000"/>
-                <a:lumOff val="40000"/>
-              </a:schemeClr>
-            </a:solidFill>
-            <a:headEnd/>
-            <a:tailEnd/>
-          </a:ln>
-          <a:extLst/>
-        </p:spPr>
-        <p:style>
-          <a:lnRef idx="1">
-            <a:schemeClr val="accent4"/>
-          </a:lnRef>
-          <a:fillRef idx="2">
-            <a:schemeClr val="accent4"/>
-          </a:fillRef>
-          <a:effectRef idx="1">
-            <a:schemeClr val="accent4"/>
-          </a:effectRef>
-          <a:fontRef idx="minor">
-            <a:schemeClr val="dk1"/>
-          </a:fontRef>
-        </p:style>
-        <p:txBody>
-          <a:bodyPr wrap="none" anchor="ctr"/>
-          <a:lstStyle>
-            <a:defPPr>
-              <a:defRPr lang="es-ES"/>
-            </a:defPPr>
-            <a:lvl1pPr algn="l" rtl="0" fontAlgn="base">
-              <a:spcBef>
-                <a:spcPct val="0"/>
-              </a:spcBef>
-              <a:spcAft>
-                <a:spcPct val="0"/>
-              </a:spcAft>
-              <a:defRPr kern="1200">
-                <a:solidFill>
-                  <a:schemeClr val="tx1"/>
-                </a:solidFill>
-                <a:latin typeface="Arial" charset="0"/>
-                <a:ea typeface="ＭＳ Ｐゴシック" charset="0"/>
-                <a:cs typeface="ＭＳ Ｐゴシック" charset="0"/>
-              </a:defRPr>
-            </a:lvl1pPr>
-            <a:lvl2pPr marL="457200" algn="l" rtl="0" fontAlgn="base">
-              <a:spcBef>
-                <a:spcPct val="0"/>
-              </a:spcBef>
-              <a:spcAft>
-                <a:spcPct val="0"/>
-              </a:spcAft>
-              <a:defRPr kern="1200">
-                <a:solidFill>
-                  <a:schemeClr val="tx1"/>
-                </a:solidFill>
-                <a:latin typeface="Arial" charset="0"/>
-                <a:ea typeface="ＭＳ Ｐゴシック" charset="0"/>
-                <a:cs typeface="ＭＳ Ｐゴシック" charset="0"/>
-              </a:defRPr>
-            </a:lvl2pPr>
-            <a:lvl3pPr marL="914400" algn="l" rtl="0" fontAlgn="base">
-              <a:spcBef>
-                <a:spcPct val="0"/>
-              </a:spcBef>
-              <a:spcAft>
-                <a:spcPct val="0"/>
-              </a:spcAft>
-              <a:defRPr kern="1200">
-                <a:solidFill>
-                  <a:schemeClr val="tx1"/>
-                </a:solidFill>
-                <a:latin typeface="Arial" charset="0"/>
-                <a:ea typeface="ＭＳ Ｐゴシック" charset="0"/>
-                <a:cs typeface="ＭＳ Ｐゴシック" charset="0"/>
-              </a:defRPr>
-            </a:lvl3pPr>
-            <a:lvl4pPr marL="1371600" algn="l" rtl="0" fontAlgn="base">
-              <a:spcBef>
-                <a:spcPct val="0"/>
-              </a:spcBef>
-              <a:spcAft>
-                <a:spcPct val="0"/>
-              </a:spcAft>
-              <a:defRPr kern="1200">
-                <a:solidFill>
-                  <a:schemeClr val="tx1"/>
-                </a:solidFill>
-                <a:latin typeface="Arial" charset="0"/>
-                <a:ea typeface="ＭＳ Ｐゴシック" charset="0"/>
-                <a:cs typeface="ＭＳ Ｐゴシック" charset="0"/>
-              </a:defRPr>
-            </a:lvl4pPr>
-            <a:lvl5pPr marL="1828800" algn="l" rtl="0" fontAlgn="base">
-              <a:spcBef>
-                <a:spcPct val="0"/>
-              </a:spcBef>
-              <a:spcAft>
-                <a:spcPct val="0"/>
-              </a:spcAft>
-              <a:defRPr kern="1200">
-                <a:solidFill>
-                  <a:schemeClr val="tx1"/>
-                </a:solidFill>
-                <a:latin typeface="Arial" charset="0"/>
-                <a:ea typeface="ＭＳ Ｐゴシック" charset="0"/>
-                <a:cs typeface="ＭＳ Ｐゴシック" charset="0"/>
-              </a:defRPr>
-            </a:lvl5pPr>
-            <a:lvl6pPr marL="2286000" algn="l" defTabSz="457200" rtl="0" eaLnBrk="1" latinLnBrk="0" hangingPunct="1">
-              <a:defRPr kern="1200">
-                <a:solidFill>
-                  <a:schemeClr val="tx1"/>
-                </a:solidFill>
-                <a:latin typeface="Arial" charset="0"/>
-                <a:ea typeface="ＭＳ Ｐゴシック" charset="0"/>
-                <a:cs typeface="ＭＳ Ｐゴシック" charset="0"/>
-              </a:defRPr>
-            </a:lvl6pPr>
-            <a:lvl7pPr marL="2743200" algn="l" defTabSz="457200" rtl="0" eaLnBrk="1" latinLnBrk="0" hangingPunct="1">
-              <a:defRPr kern="1200">
-                <a:solidFill>
-                  <a:schemeClr val="tx1"/>
-                </a:solidFill>
-                <a:latin typeface="Arial" charset="0"/>
-                <a:ea typeface="ＭＳ Ｐゴシック" charset="0"/>
-                <a:cs typeface="ＭＳ Ｐゴシック" charset="0"/>
-              </a:defRPr>
-            </a:lvl7pPr>
-            <a:lvl8pPr marL="3200400" algn="l" defTabSz="457200" rtl="0" eaLnBrk="1" latinLnBrk="0" hangingPunct="1">
-              <a:defRPr kern="1200">
-                <a:solidFill>
-                  <a:schemeClr val="tx1"/>
-                </a:solidFill>
-                <a:latin typeface="Arial" charset="0"/>
-                <a:ea typeface="ＭＳ Ｐゴシック" charset="0"/>
-                <a:cs typeface="ＭＳ Ｐゴシック" charset="0"/>
-              </a:defRPr>
-            </a:lvl8pPr>
-            <a:lvl9pPr marL="3657600" algn="l" defTabSz="457200" rtl="0" eaLnBrk="1" latinLnBrk="0" hangingPunct="1">
-              <a:defRPr kern="1200">
-                <a:solidFill>
-                  <a:schemeClr val="tx1"/>
-                </a:solidFill>
-                <a:latin typeface="Arial" charset="0"/>
-                <a:ea typeface="ＭＳ Ｐゴシック" charset="0"/>
-                <a:cs typeface="ＭＳ Ｐゴシック" charset="0"/>
-              </a:defRPr>
-            </a:lvl9pPr>
-          </a:lstStyle>
-          <a:p>
-            <a:pPr>
-              <a:defRPr/>
-            </a:pPr>
-            <a:endParaRPr lang="en-GB" sz="1100">
-              <a:cs typeface="+mn-cs"/>
-            </a:endParaRPr>
-          </a:p>
-        </p:txBody>
-      </p:sp>
-      <p:sp>
-        <p:nvSpPr>
-          <p:cNvPr id="109" name="Rectangle à coins arrondis 131"/>
-          <p:cNvSpPr/>
-          <p:nvPr/>
-        </p:nvSpPr>
-        <p:spPr>
-          <a:xfrm>
-            <a:off x="1912053" y="116633"/>
-            <a:ext cx="5601314" cy="5552803"/>
-          </a:xfrm>
-          <a:prstGeom prst="roundRect">
-            <a:avLst>
-              <a:gd name="adj" fmla="val 12341"/>
-            </a:avLst>
-          </a:prstGeom>
-          <a:solidFill>
-            <a:schemeClr val="accent3">
-              <a:alpha val="41000"/>
-            </a:schemeClr>
-          </a:solidFill>
-          <a:ln>
-            <a:solidFill>
-              <a:schemeClr val="accent3">
-                <a:lumMod val="75000"/>
-              </a:schemeClr>
-            </a:solidFill>
-          </a:ln>
-          <a:effectLst/>
-        </p:spPr>
-        <p:style>
-          <a:lnRef idx="1">
-            <a:schemeClr val="accent1"/>
-          </a:lnRef>
-          <a:fillRef idx="3">
-            <a:schemeClr val="accent1"/>
-          </a:fillRef>
-          <a:effectRef idx="2">
-            <a:schemeClr val="accent1"/>
-          </a:effectRef>
-          <a:fontRef idx="minor">
-            <a:schemeClr val="lt1"/>
-          </a:fontRef>
-        </p:style>
-        <p:txBody>
-          <a:bodyPr rtlCol="0" anchor="ctr"/>
-          <a:lstStyle/>
-          <a:p>
-            <a:pPr algn="ctr"/>
-            <a:endParaRPr lang="en-GB" dirty="0" smtClean="0">
-              <a:solidFill>
-                <a:schemeClr val="bg2">
-                  <a:lumMod val="25000"/>
-                </a:schemeClr>
-              </a:solidFill>
-              <a:latin typeface="Consolas"/>
-              <a:cs typeface="Consolas"/>
-              <a:sym typeface="Symbol" charset="0"/>
-            </a:endParaRPr>
-          </a:p>
-          <a:p>
-            <a:pPr algn="ctr"/>
-            <a:r>
-              <a:rPr lang="en-GB" dirty="0" smtClean="0">
-                <a:solidFill>
-                  <a:schemeClr val="bg2">
-                    <a:lumMod val="25000"/>
-                  </a:schemeClr>
-                </a:solidFill>
-                <a:latin typeface="Consolas"/>
-                <a:cs typeface="Consolas"/>
-                <a:sym typeface="Symbol" charset="0"/>
-              </a:rPr>
-              <a:t></a:t>
-            </a:r>
-            <a:r>
-              <a:rPr lang="es-MX" dirty="0" smtClean="0">
-                <a:solidFill>
-                  <a:schemeClr val="bg2">
-                    <a:lumMod val="25000"/>
-                  </a:schemeClr>
-                </a:solidFill>
-              </a:rPr>
-              <a:t>SOD-</a:t>
-            </a:r>
-            <a:r>
-              <a:rPr lang="es-MX" dirty="0" smtClean="0">
-                <a:solidFill>
-                  <a:schemeClr val="bg2">
-                    <a:lumMod val="25000"/>
-                  </a:schemeClr>
-                </a:solidFill>
-              </a:rPr>
-              <a:t>M</a:t>
-            </a:r>
-          </a:p>
-          <a:p>
-            <a:pPr algn="ctr"/>
-            <a:endParaRPr lang="es-MX" dirty="0">
-              <a:solidFill>
-                <a:schemeClr val="bg2">
-                  <a:lumMod val="25000"/>
-                </a:schemeClr>
-              </a:solidFill>
-            </a:endParaRPr>
-          </a:p>
-          <a:p>
-            <a:pPr algn="ctr"/>
-            <a:endParaRPr lang="es-MX" dirty="0" smtClean="0">
-              <a:solidFill>
-                <a:schemeClr val="bg2">
-                  <a:lumMod val="25000"/>
-                </a:schemeClr>
-              </a:solidFill>
-            </a:endParaRPr>
-          </a:p>
-          <a:p>
-            <a:pPr algn="ctr"/>
-            <a:endParaRPr lang="es-MX" dirty="0">
-              <a:solidFill>
-                <a:schemeClr val="bg2">
-                  <a:lumMod val="25000"/>
-                </a:schemeClr>
-              </a:solidFill>
-            </a:endParaRPr>
-          </a:p>
-          <a:p>
-            <a:pPr algn="ctr"/>
-            <a:endParaRPr lang="es-MX" dirty="0" smtClean="0">
-              <a:solidFill>
-                <a:schemeClr val="bg2">
-                  <a:lumMod val="25000"/>
-                </a:schemeClr>
-              </a:solidFill>
-            </a:endParaRPr>
-          </a:p>
-          <a:p>
-            <a:pPr algn="ctr"/>
-            <a:endParaRPr lang="es-MX" dirty="0" smtClean="0">
-              <a:solidFill>
-                <a:schemeClr val="bg2">
-                  <a:lumMod val="25000"/>
-                </a:schemeClr>
-              </a:solidFill>
-            </a:endParaRPr>
-          </a:p>
-          <a:p>
-            <a:pPr algn="ctr"/>
-            <a:endParaRPr lang="es-MX" dirty="0">
-              <a:solidFill>
-                <a:schemeClr val="bg2">
-                  <a:lumMod val="25000"/>
-                </a:schemeClr>
-              </a:solidFill>
-            </a:endParaRPr>
-          </a:p>
-          <a:p>
-            <a:pPr algn="ctr"/>
-            <a:endParaRPr lang="es-MX" dirty="0" smtClean="0">
-              <a:solidFill>
-                <a:schemeClr val="bg2">
-                  <a:lumMod val="25000"/>
-                </a:schemeClr>
-              </a:solidFill>
-            </a:endParaRPr>
-          </a:p>
-          <a:p>
-            <a:pPr algn="ctr"/>
-            <a:endParaRPr lang="es-MX" dirty="0" smtClean="0">
-              <a:solidFill>
-                <a:srgbClr val="7F7F7F"/>
-              </a:solidFill>
-            </a:endParaRPr>
-          </a:p>
-          <a:p>
-            <a:pPr algn="ctr"/>
-            <a:endParaRPr lang="es-MX" dirty="0" smtClean="0">
-              <a:solidFill>
-                <a:srgbClr val="7F7F7F"/>
-              </a:solidFill>
-            </a:endParaRPr>
-          </a:p>
-          <a:p>
-            <a:pPr algn="ctr"/>
-            <a:endParaRPr lang="es-MX" dirty="0">
-              <a:solidFill>
-                <a:srgbClr val="7F7F7F"/>
-              </a:solidFill>
-            </a:endParaRPr>
-          </a:p>
-          <a:p>
-            <a:pPr algn="ctr"/>
-            <a:endParaRPr lang="es-MX" dirty="0" smtClean="0">
-              <a:solidFill>
-                <a:srgbClr val="7F7F7F"/>
-              </a:solidFill>
-            </a:endParaRPr>
-          </a:p>
-          <a:p>
-            <a:pPr algn="ctr"/>
-            <a:endParaRPr lang="es-MX" dirty="0" smtClean="0">
-              <a:solidFill>
-                <a:srgbClr val="7F7F7F"/>
-              </a:solidFill>
-            </a:endParaRPr>
-          </a:p>
-          <a:p>
-            <a:pPr algn="ctr"/>
-            <a:endParaRPr lang="es-MX" dirty="0" smtClean="0">
-              <a:solidFill>
-                <a:srgbClr val="7F7F7F"/>
-              </a:solidFill>
-            </a:endParaRPr>
-          </a:p>
-          <a:p>
-            <a:pPr algn="ctr"/>
-            <a:endParaRPr lang="es-MX" dirty="0" smtClean="0">
-              <a:solidFill>
-                <a:srgbClr val="7F7F7F"/>
-              </a:solidFill>
-            </a:endParaRPr>
-          </a:p>
-          <a:p>
-            <a:pPr algn="ctr"/>
-            <a:endParaRPr lang="es-MX" dirty="0" smtClean="0">
-              <a:solidFill>
-                <a:srgbClr val="7F7F7F"/>
-              </a:solidFill>
-            </a:endParaRPr>
-          </a:p>
-          <a:p>
-            <a:pPr algn="ctr"/>
-            <a:endParaRPr lang="es-MX" dirty="0" smtClean="0">
-              <a:solidFill>
-                <a:srgbClr val="7F7F7F"/>
-              </a:solidFill>
-            </a:endParaRPr>
-          </a:p>
-          <a:p>
-            <a:pPr algn="ctr"/>
-            <a:endParaRPr lang="es-MX" dirty="0" smtClean="0">
-              <a:solidFill>
-                <a:srgbClr val="7F7F7F"/>
-              </a:solidFill>
-            </a:endParaRPr>
-          </a:p>
-          <a:p>
-            <a:pPr algn="ctr"/>
-            <a:endParaRPr lang="es-MX" dirty="0" smtClean="0">
-              <a:solidFill>
-                <a:srgbClr val="7F7F7F"/>
-              </a:solidFill>
-            </a:endParaRPr>
-          </a:p>
-          <a:p>
-            <a:pPr algn="ctr"/>
-            <a:endParaRPr lang="es-MX" dirty="0" smtClean="0">
-              <a:solidFill>
-                <a:srgbClr val="7F7F7F"/>
-              </a:solidFill>
-            </a:endParaRPr>
-          </a:p>
-          <a:p>
-            <a:pPr algn="ctr"/>
-            <a:endParaRPr lang="es-MX" dirty="0">
-              <a:solidFill>
-                <a:srgbClr val="7F7F7F"/>
-              </a:solidFill>
-            </a:endParaRPr>
-          </a:p>
-        </p:txBody>
-      </p:sp>
-      <p:sp>
-        <p:nvSpPr>
           <p:cNvPr id="88" name="AutoShape 21"/>
           <p:cNvSpPr>
             <a:spLocks noChangeArrowheads="1"/>
@@ -3878,8 +3045,8 @@
         </p:nvSpPr>
         <p:spPr bwMode="auto">
           <a:xfrm>
-            <a:off x="6228184" y="1524705"/>
-            <a:ext cx="515309" cy="302812"/>
+            <a:off x="6382958" y="1565907"/>
+            <a:ext cx="258224" cy="261610"/>
           </a:xfrm>
           <a:prstGeom prst="downArrow">
             <a:avLst>
@@ -4040,6 +3207,972 @@
             </a:pPr>
             <a:endParaRPr lang="en-GB" sz="1100">
               <a:cs typeface="+mn-cs"/>
+            </a:endParaRPr>
+          </a:p>
+        </p:txBody>
+      </p:sp>
+      <p:sp>
+        <p:nvSpPr>
+          <p:cNvPr id="91" name="AutoShape 21"/>
+          <p:cNvSpPr>
+            <a:spLocks noChangeArrowheads="1"/>
+          </p:cNvSpPr>
+          <p:nvPr/>
+        </p:nvSpPr>
+        <p:spPr bwMode="auto">
+          <a:xfrm>
+            <a:off x="6372199" y="2536507"/>
+            <a:ext cx="258223" cy="232173"/>
+          </a:xfrm>
+          <a:prstGeom prst="downArrow">
+            <a:avLst>
+              <a:gd name="adj1" fmla="val 49778"/>
+              <a:gd name="adj2" fmla="val 39009"/>
+            </a:avLst>
+          </a:prstGeom>
+          <a:solidFill>
+            <a:schemeClr val="accent3">
+              <a:lumMod val="50000"/>
+              <a:alpha val="72000"/>
+            </a:schemeClr>
+          </a:solidFill>
+          <a:ln w="12700" cmpd="sng">
+            <a:solidFill>
+              <a:schemeClr val="accent3">
+                <a:lumMod val="60000"/>
+                <a:lumOff val="40000"/>
+              </a:schemeClr>
+            </a:solidFill>
+            <a:miter lim="800000"/>
+            <a:headEnd/>
+            <a:tailEnd/>
+          </a:ln>
+          <a:effectLst/>
+          <a:extLst/>
+        </p:spPr>
+        <p:txBody>
+          <a:bodyPr wrap="none" anchor="ctr"/>
+          <a:lstStyle>
+            <a:defPPr>
+              <a:defRPr lang="es-ES"/>
+            </a:defPPr>
+            <a:lvl1pPr algn="l" rtl="0" fontAlgn="base">
+              <a:spcBef>
+                <a:spcPct val="0"/>
+              </a:spcBef>
+              <a:spcAft>
+                <a:spcPct val="0"/>
+              </a:spcAft>
+              <a:defRPr kern="1200">
+                <a:solidFill>
+                  <a:schemeClr val="tx1"/>
+                </a:solidFill>
+                <a:latin typeface="Arial" charset="0"/>
+                <a:ea typeface="ＭＳ Ｐゴシック" charset="0"/>
+                <a:cs typeface="ＭＳ Ｐゴシック" charset="0"/>
+              </a:defRPr>
+            </a:lvl1pPr>
+            <a:lvl2pPr marL="457200" algn="l" rtl="0" fontAlgn="base">
+              <a:spcBef>
+                <a:spcPct val="0"/>
+              </a:spcBef>
+              <a:spcAft>
+                <a:spcPct val="0"/>
+              </a:spcAft>
+              <a:defRPr kern="1200">
+                <a:solidFill>
+                  <a:schemeClr val="tx1"/>
+                </a:solidFill>
+                <a:latin typeface="Arial" charset="0"/>
+                <a:ea typeface="ＭＳ Ｐゴシック" charset="0"/>
+                <a:cs typeface="ＭＳ Ｐゴシック" charset="0"/>
+              </a:defRPr>
+            </a:lvl2pPr>
+            <a:lvl3pPr marL="914400" algn="l" rtl="0" fontAlgn="base">
+              <a:spcBef>
+                <a:spcPct val="0"/>
+              </a:spcBef>
+              <a:spcAft>
+                <a:spcPct val="0"/>
+              </a:spcAft>
+              <a:defRPr kern="1200">
+                <a:solidFill>
+                  <a:schemeClr val="tx1"/>
+                </a:solidFill>
+                <a:latin typeface="Arial" charset="0"/>
+                <a:ea typeface="ＭＳ Ｐゴシック" charset="0"/>
+                <a:cs typeface="ＭＳ Ｐゴシック" charset="0"/>
+              </a:defRPr>
+            </a:lvl3pPr>
+            <a:lvl4pPr marL="1371600" algn="l" rtl="0" fontAlgn="base">
+              <a:spcBef>
+                <a:spcPct val="0"/>
+              </a:spcBef>
+              <a:spcAft>
+                <a:spcPct val="0"/>
+              </a:spcAft>
+              <a:defRPr kern="1200">
+                <a:solidFill>
+                  <a:schemeClr val="tx1"/>
+                </a:solidFill>
+                <a:latin typeface="Arial" charset="0"/>
+                <a:ea typeface="ＭＳ Ｐゴシック" charset="0"/>
+                <a:cs typeface="ＭＳ Ｐゴシック" charset="0"/>
+              </a:defRPr>
+            </a:lvl4pPr>
+            <a:lvl5pPr marL="1828800" algn="l" rtl="0" fontAlgn="base">
+              <a:spcBef>
+                <a:spcPct val="0"/>
+              </a:spcBef>
+              <a:spcAft>
+                <a:spcPct val="0"/>
+              </a:spcAft>
+              <a:defRPr kern="1200">
+                <a:solidFill>
+                  <a:schemeClr val="tx1"/>
+                </a:solidFill>
+                <a:latin typeface="Arial" charset="0"/>
+                <a:ea typeface="ＭＳ Ｐゴシック" charset="0"/>
+                <a:cs typeface="ＭＳ Ｐゴシック" charset="0"/>
+              </a:defRPr>
+            </a:lvl5pPr>
+            <a:lvl6pPr marL="2286000" algn="l" defTabSz="457200" rtl="0" eaLnBrk="1" latinLnBrk="0" hangingPunct="1">
+              <a:defRPr kern="1200">
+                <a:solidFill>
+                  <a:schemeClr val="tx1"/>
+                </a:solidFill>
+                <a:latin typeface="Arial" charset="0"/>
+                <a:ea typeface="ＭＳ Ｐゴシック" charset="0"/>
+                <a:cs typeface="ＭＳ Ｐゴシック" charset="0"/>
+              </a:defRPr>
+            </a:lvl6pPr>
+            <a:lvl7pPr marL="2743200" algn="l" defTabSz="457200" rtl="0" eaLnBrk="1" latinLnBrk="0" hangingPunct="1">
+              <a:defRPr kern="1200">
+                <a:solidFill>
+                  <a:schemeClr val="tx1"/>
+                </a:solidFill>
+                <a:latin typeface="Arial" charset="0"/>
+                <a:ea typeface="ＭＳ Ｐゴシック" charset="0"/>
+                <a:cs typeface="ＭＳ Ｐゴシック" charset="0"/>
+              </a:defRPr>
+            </a:lvl7pPr>
+            <a:lvl8pPr marL="3200400" algn="l" defTabSz="457200" rtl="0" eaLnBrk="1" latinLnBrk="0" hangingPunct="1">
+              <a:defRPr kern="1200">
+                <a:solidFill>
+                  <a:schemeClr val="tx1"/>
+                </a:solidFill>
+                <a:latin typeface="Arial" charset="0"/>
+                <a:ea typeface="ＭＳ Ｐゴシック" charset="0"/>
+                <a:cs typeface="ＭＳ Ｐゴシック" charset="0"/>
+              </a:defRPr>
+            </a:lvl8pPr>
+            <a:lvl9pPr marL="3657600" algn="l" defTabSz="457200" rtl="0" eaLnBrk="1" latinLnBrk="0" hangingPunct="1">
+              <a:defRPr kern="1200">
+                <a:solidFill>
+                  <a:schemeClr val="tx1"/>
+                </a:solidFill>
+                <a:latin typeface="Arial" charset="0"/>
+                <a:ea typeface="ＭＳ Ｐゴシック" charset="0"/>
+                <a:cs typeface="ＭＳ Ｐゴシック" charset="0"/>
+              </a:defRPr>
+            </a:lvl9pPr>
+          </a:lstStyle>
+          <a:p>
+            <a:pPr>
+              <a:defRPr/>
+            </a:pPr>
+            <a:endParaRPr lang="en-GB" sz="1100">
+              <a:cs typeface="+mn-cs"/>
+            </a:endParaRPr>
+          </a:p>
+        </p:txBody>
+      </p:sp>
+      <p:sp>
+        <p:nvSpPr>
+          <p:cNvPr id="92" name="AutoShape 21"/>
+          <p:cNvSpPr>
+            <a:spLocks noChangeArrowheads="1"/>
+          </p:cNvSpPr>
+          <p:nvPr/>
+        </p:nvSpPr>
+        <p:spPr bwMode="auto">
+          <a:xfrm>
+            <a:off x="6382958" y="3431901"/>
+            <a:ext cx="258223" cy="232173"/>
+          </a:xfrm>
+          <a:prstGeom prst="downArrow">
+            <a:avLst>
+              <a:gd name="adj1" fmla="val 49778"/>
+              <a:gd name="adj2" fmla="val 39009"/>
+            </a:avLst>
+          </a:prstGeom>
+          <a:solidFill>
+            <a:schemeClr val="accent3">
+              <a:lumMod val="50000"/>
+              <a:alpha val="72000"/>
+            </a:schemeClr>
+          </a:solidFill>
+          <a:ln w="12700" cmpd="sng">
+            <a:solidFill>
+              <a:schemeClr val="accent3">
+                <a:lumMod val="60000"/>
+                <a:lumOff val="40000"/>
+              </a:schemeClr>
+            </a:solidFill>
+            <a:miter lim="800000"/>
+            <a:headEnd/>
+            <a:tailEnd/>
+          </a:ln>
+          <a:effectLst/>
+          <a:extLst/>
+        </p:spPr>
+        <p:txBody>
+          <a:bodyPr wrap="none" anchor="ctr"/>
+          <a:lstStyle>
+            <a:defPPr>
+              <a:defRPr lang="es-ES"/>
+            </a:defPPr>
+            <a:lvl1pPr algn="l" rtl="0" fontAlgn="base">
+              <a:spcBef>
+                <a:spcPct val="0"/>
+              </a:spcBef>
+              <a:spcAft>
+                <a:spcPct val="0"/>
+              </a:spcAft>
+              <a:defRPr kern="1200">
+                <a:solidFill>
+                  <a:schemeClr val="tx1"/>
+                </a:solidFill>
+                <a:latin typeface="Arial" charset="0"/>
+                <a:ea typeface="ＭＳ Ｐゴシック" charset="0"/>
+                <a:cs typeface="ＭＳ Ｐゴシック" charset="0"/>
+              </a:defRPr>
+            </a:lvl1pPr>
+            <a:lvl2pPr marL="457200" algn="l" rtl="0" fontAlgn="base">
+              <a:spcBef>
+                <a:spcPct val="0"/>
+              </a:spcBef>
+              <a:spcAft>
+                <a:spcPct val="0"/>
+              </a:spcAft>
+              <a:defRPr kern="1200">
+                <a:solidFill>
+                  <a:schemeClr val="tx1"/>
+                </a:solidFill>
+                <a:latin typeface="Arial" charset="0"/>
+                <a:ea typeface="ＭＳ Ｐゴシック" charset="0"/>
+                <a:cs typeface="ＭＳ Ｐゴシック" charset="0"/>
+              </a:defRPr>
+            </a:lvl2pPr>
+            <a:lvl3pPr marL="914400" algn="l" rtl="0" fontAlgn="base">
+              <a:spcBef>
+                <a:spcPct val="0"/>
+              </a:spcBef>
+              <a:spcAft>
+                <a:spcPct val="0"/>
+              </a:spcAft>
+              <a:defRPr kern="1200">
+                <a:solidFill>
+                  <a:schemeClr val="tx1"/>
+                </a:solidFill>
+                <a:latin typeface="Arial" charset="0"/>
+                <a:ea typeface="ＭＳ Ｐゴシック" charset="0"/>
+                <a:cs typeface="ＭＳ Ｐゴシック" charset="0"/>
+              </a:defRPr>
+            </a:lvl3pPr>
+            <a:lvl4pPr marL="1371600" algn="l" rtl="0" fontAlgn="base">
+              <a:spcBef>
+                <a:spcPct val="0"/>
+              </a:spcBef>
+              <a:spcAft>
+                <a:spcPct val="0"/>
+              </a:spcAft>
+              <a:defRPr kern="1200">
+                <a:solidFill>
+                  <a:schemeClr val="tx1"/>
+                </a:solidFill>
+                <a:latin typeface="Arial" charset="0"/>
+                <a:ea typeface="ＭＳ Ｐゴシック" charset="0"/>
+                <a:cs typeface="ＭＳ Ｐゴシック" charset="0"/>
+              </a:defRPr>
+            </a:lvl4pPr>
+            <a:lvl5pPr marL="1828800" algn="l" rtl="0" fontAlgn="base">
+              <a:spcBef>
+                <a:spcPct val="0"/>
+              </a:spcBef>
+              <a:spcAft>
+                <a:spcPct val="0"/>
+              </a:spcAft>
+              <a:defRPr kern="1200">
+                <a:solidFill>
+                  <a:schemeClr val="tx1"/>
+                </a:solidFill>
+                <a:latin typeface="Arial" charset="0"/>
+                <a:ea typeface="ＭＳ Ｐゴシック" charset="0"/>
+                <a:cs typeface="ＭＳ Ｐゴシック" charset="0"/>
+              </a:defRPr>
+            </a:lvl5pPr>
+            <a:lvl6pPr marL="2286000" algn="l" defTabSz="457200" rtl="0" eaLnBrk="1" latinLnBrk="0" hangingPunct="1">
+              <a:defRPr kern="1200">
+                <a:solidFill>
+                  <a:schemeClr val="tx1"/>
+                </a:solidFill>
+                <a:latin typeface="Arial" charset="0"/>
+                <a:ea typeface="ＭＳ Ｐゴシック" charset="0"/>
+                <a:cs typeface="ＭＳ Ｐゴシック" charset="0"/>
+              </a:defRPr>
+            </a:lvl6pPr>
+            <a:lvl7pPr marL="2743200" algn="l" defTabSz="457200" rtl="0" eaLnBrk="1" latinLnBrk="0" hangingPunct="1">
+              <a:defRPr kern="1200">
+                <a:solidFill>
+                  <a:schemeClr val="tx1"/>
+                </a:solidFill>
+                <a:latin typeface="Arial" charset="0"/>
+                <a:ea typeface="ＭＳ Ｐゴシック" charset="0"/>
+                <a:cs typeface="ＭＳ Ｐゴシック" charset="0"/>
+              </a:defRPr>
+            </a:lvl7pPr>
+            <a:lvl8pPr marL="3200400" algn="l" defTabSz="457200" rtl="0" eaLnBrk="1" latinLnBrk="0" hangingPunct="1">
+              <a:defRPr kern="1200">
+                <a:solidFill>
+                  <a:schemeClr val="tx1"/>
+                </a:solidFill>
+                <a:latin typeface="Arial" charset="0"/>
+                <a:ea typeface="ＭＳ Ｐゴシック" charset="0"/>
+                <a:cs typeface="ＭＳ Ｐゴシック" charset="0"/>
+              </a:defRPr>
+            </a:lvl8pPr>
+            <a:lvl9pPr marL="3657600" algn="l" defTabSz="457200" rtl="0" eaLnBrk="1" latinLnBrk="0" hangingPunct="1">
+              <a:defRPr kern="1200">
+                <a:solidFill>
+                  <a:schemeClr val="tx1"/>
+                </a:solidFill>
+                <a:latin typeface="Arial" charset="0"/>
+                <a:ea typeface="ＭＳ Ｐゴシック" charset="0"/>
+                <a:cs typeface="ＭＳ Ｐゴシック" charset="0"/>
+              </a:defRPr>
+            </a:lvl9pPr>
+          </a:lstStyle>
+          <a:p>
+            <a:pPr>
+              <a:defRPr/>
+            </a:pPr>
+            <a:endParaRPr lang="en-GB" sz="1100">
+              <a:cs typeface="+mn-cs"/>
+            </a:endParaRPr>
+          </a:p>
+        </p:txBody>
+      </p:sp>
+      <p:sp>
+        <p:nvSpPr>
+          <p:cNvPr id="93" name="AutoShape 21"/>
+          <p:cNvSpPr>
+            <a:spLocks noChangeArrowheads="1"/>
+          </p:cNvSpPr>
+          <p:nvPr/>
+        </p:nvSpPr>
+        <p:spPr bwMode="auto">
+          <a:xfrm>
+            <a:off x="6372199" y="4320654"/>
+            <a:ext cx="258223" cy="504056"/>
+          </a:xfrm>
+          <a:prstGeom prst="downArrow">
+            <a:avLst>
+              <a:gd name="adj1" fmla="val 49778"/>
+              <a:gd name="adj2" fmla="val 39009"/>
+            </a:avLst>
+          </a:prstGeom>
+          <a:solidFill>
+            <a:schemeClr val="accent3">
+              <a:lumMod val="50000"/>
+              <a:alpha val="72000"/>
+            </a:schemeClr>
+          </a:solidFill>
+          <a:ln w="12700" cmpd="sng">
+            <a:solidFill>
+              <a:schemeClr val="accent3">
+                <a:lumMod val="60000"/>
+                <a:lumOff val="40000"/>
+              </a:schemeClr>
+            </a:solidFill>
+            <a:miter lim="800000"/>
+            <a:headEnd/>
+            <a:tailEnd/>
+          </a:ln>
+          <a:effectLst/>
+          <a:extLst/>
+        </p:spPr>
+        <p:txBody>
+          <a:bodyPr wrap="none" anchor="ctr"/>
+          <a:lstStyle>
+            <a:defPPr>
+              <a:defRPr lang="es-ES"/>
+            </a:defPPr>
+            <a:lvl1pPr algn="l" rtl="0" fontAlgn="base">
+              <a:spcBef>
+                <a:spcPct val="0"/>
+              </a:spcBef>
+              <a:spcAft>
+                <a:spcPct val="0"/>
+              </a:spcAft>
+              <a:defRPr kern="1200">
+                <a:solidFill>
+                  <a:schemeClr val="tx1"/>
+                </a:solidFill>
+                <a:latin typeface="Arial" charset="0"/>
+                <a:ea typeface="ＭＳ Ｐゴシック" charset="0"/>
+                <a:cs typeface="ＭＳ Ｐゴシック" charset="0"/>
+              </a:defRPr>
+            </a:lvl1pPr>
+            <a:lvl2pPr marL="457200" algn="l" rtl="0" fontAlgn="base">
+              <a:spcBef>
+                <a:spcPct val="0"/>
+              </a:spcBef>
+              <a:spcAft>
+                <a:spcPct val="0"/>
+              </a:spcAft>
+              <a:defRPr kern="1200">
+                <a:solidFill>
+                  <a:schemeClr val="tx1"/>
+                </a:solidFill>
+                <a:latin typeface="Arial" charset="0"/>
+                <a:ea typeface="ＭＳ Ｐゴシック" charset="0"/>
+                <a:cs typeface="ＭＳ Ｐゴシック" charset="0"/>
+              </a:defRPr>
+            </a:lvl2pPr>
+            <a:lvl3pPr marL="914400" algn="l" rtl="0" fontAlgn="base">
+              <a:spcBef>
+                <a:spcPct val="0"/>
+              </a:spcBef>
+              <a:spcAft>
+                <a:spcPct val="0"/>
+              </a:spcAft>
+              <a:defRPr kern="1200">
+                <a:solidFill>
+                  <a:schemeClr val="tx1"/>
+                </a:solidFill>
+                <a:latin typeface="Arial" charset="0"/>
+                <a:ea typeface="ＭＳ Ｐゴシック" charset="0"/>
+                <a:cs typeface="ＭＳ Ｐゴシック" charset="0"/>
+              </a:defRPr>
+            </a:lvl3pPr>
+            <a:lvl4pPr marL="1371600" algn="l" rtl="0" fontAlgn="base">
+              <a:spcBef>
+                <a:spcPct val="0"/>
+              </a:spcBef>
+              <a:spcAft>
+                <a:spcPct val="0"/>
+              </a:spcAft>
+              <a:defRPr kern="1200">
+                <a:solidFill>
+                  <a:schemeClr val="tx1"/>
+                </a:solidFill>
+                <a:latin typeface="Arial" charset="0"/>
+                <a:ea typeface="ＭＳ Ｐゴシック" charset="0"/>
+                <a:cs typeface="ＭＳ Ｐゴシック" charset="0"/>
+              </a:defRPr>
+            </a:lvl4pPr>
+            <a:lvl5pPr marL="1828800" algn="l" rtl="0" fontAlgn="base">
+              <a:spcBef>
+                <a:spcPct val="0"/>
+              </a:spcBef>
+              <a:spcAft>
+                <a:spcPct val="0"/>
+              </a:spcAft>
+              <a:defRPr kern="1200">
+                <a:solidFill>
+                  <a:schemeClr val="tx1"/>
+                </a:solidFill>
+                <a:latin typeface="Arial" charset="0"/>
+                <a:ea typeface="ＭＳ Ｐゴシック" charset="0"/>
+                <a:cs typeface="ＭＳ Ｐゴシック" charset="0"/>
+              </a:defRPr>
+            </a:lvl5pPr>
+            <a:lvl6pPr marL="2286000" algn="l" defTabSz="457200" rtl="0" eaLnBrk="1" latinLnBrk="0" hangingPunct="1">
+              <a:defRPr kern="1200">
+                <a:solidFill>
+                  <a:schemeClr val="tx1"/>
+                </a:solidFill>
+                <a:latin typeface="Arial" charset="0"/>
+                <a:ea typeface="ＭＳ Ｐゴシック" charset="0"/>
+                <a:cs typeface="ＭＳ Ｐゴシック" charset="0"/>
+              </a:defRPr>
+            </a:lvl6pPr>
+            <a:lvl7pPr marL="2743200" algn="l" defTabSz="457200" rtl="0" eaLnBrk="1" latinLnBrk="0" hangingPunct="1">
+              <a:defRPr kern="1200">
+                <a:solidFill>
+                  <a:schemeClr val="tx1"/>
+                </a:solidFill>
+                <a:latin typeface="Arial" charset="0"/>
+                <a:ea typeface="ＭＳ Ｐゴシック" charset="0"/>
+                <a:cs typeface="ＭＳ Ｐゴシック" charset="0"/>
+              </a:defRPr>
+            </a:lvl7pPr>
+            <a:lvl8pPr marL="3200400" algn="l" defTabSz="457200" rtl="0" eaLnBrk="1" latinLnBrk="0" hangingPunct="1">
+              <a:defRPr kern="1200">
+                <a:solidFill>
+                  <a:schemeClr val="tx1"/>
+                </a:solidFill>
+                <a:latin typeface="Arial" charset="0"/>
+                <a:ea typeface="ＭＳ Ｐゴシック" charset="0"/>
+                <a:cs typeface="ＭＳ Ｐゴシック" charset="0"/>
+              </a:defRPr>
+            </a:lvl8pPr>
+            <a:lvl9pPr marL="3657600" algn="l" defTabSz="457200" rtl="0" eaLnBrk="1" latinLnBrk="0" hangingPunct="1">
+              <a:defRPr kern="1200">
+                <a:solidFill>
+                  <a:schemeClr val="tx1"/>
+                </a:solidFill>
+                <a:latin typeface="Arial" charset="0"/>
+                <a:ea typeface="ＭＳ Ｐゴシック" charset="0"/>
+                <a:cs typeface="ＭＳ Ｐゴシック" charset="0"/>
+              </a:defRPr>
+            </a:lvl9pPr>
+          </a:lstStyle>
+          <a:p>
+            <a:pPr>
+              <a:defRPr/>
+            </a:pPr>
+            <a:endParaRPr lang="en-GB" sz="1100">
+              <a:cs typeface="+mn-cs"/>
+            </a:endParaRPr>
+          </a:p>
+        </p:txBody>
+      </p:sp>
+      <p:sp>
+        <p:nvSpPr>
+          <p:cNvPr id="94" name="AutoShape 21"/>
+          <p:cNvSpPr>
+            <a:spLocks noChangeArrowheads="1"/>
+          </p:cNvSpPr>
+          <p:nvPr/>
+        </p:nvSpPr>
+        <p:spPr bwMode="auto">
+          <a:xfrm>
+            <a:off x="6372199" y="5682137"/>
+            <a:ext cx="258223" cy="305244"/>
+          </a:xfrm>
+          <a:prstGeom prst="downArrow">
+            <a:avLst>
+              <a:gd name="adj1" fmla="val 49778"/>
+              <a:gd name="adj2" fmla="val 39009"/>
+            </a:avLst>
+          </a:prstGeom>
+          <a:solidFill>
+            <a:schemeClr val="accent3">
+              <a:lumMod val="50000"/>
+              <a:alpha val="72000"/>
+            </a:schemeClr>
+          </a:solidFill>
+          <a:ln w="12700" cmpd="sng">
+            <a:solidFill>
+              <a:schemeClr val="accent3">
+                <a:lumMod val="60000"/>
+                <a:lumOff val="40000"/>
+              </a:schemeClr>
+            </a:solidFill>
+            <a:miter lim="800000"/>
+            <a:headEnd/>
+            <a:tailEnd/>
+          </a:ln>
+          <a:effectLst/>
+          <a:extLst/>
+        </p:spPr>
+        <p:txBody>
+          <a:bodyPr wrap="none" anchor="ctr"/>
+          <a:lstStyle>
+            <a:defPPr>
+              <a:defRPr lang="es-ES"/>
+            </a:defPPr>
+            <a:lvl1pPr algn="l" rtl="0" fontAlgn="base">
+              <a:spcBef>
+                <a:spcPct val="0"/>
+              </a:spcBef>
+              <a:spcAft>
+                <a:spcPct val="0"/>
+              </a:spcAft>
+              <a:defRPr kern="1200">
+                <a:solidFill>
+                  <a:schemeClr val="tx1"/>
+                </a:solidFill>
+                <a:latin typeface="Arial" charset="0"/>
+                <a:ea typeface="ＭＳ Ｐゴシック" charset="0"/>
+                <a:cs typeface="ＭＳ Ｐゴシック" charset="0"/>
+              </a:defRPr>
+            </a:lvl1pPr>
+            <a:lvl2pPr marL="457200" algn="l" rtl="0" fontAlgn="base">
+              <a:spcBef>
+                <a:spcPct val="0"/>
+              </a:spcBef>
+              <a:spcAft>
+                <a:spcPct val="0"/>
+              </a:spcAft>
+              <a:defRPr kern="1200">
+                <a:solidFill>
+                  <a:schemeClr val="tx1"/>
+                </a:solidFill>
+                <a:latin typeface="Arial" charset="0"/>
+                <a:ea typeface="ＭＳ Ｐゴシック" charset="0"/>
+                <a:cs typeface="ＭＳ Ｐゴシック" charset="0"/>
+              </a:defRPr>
+            </a:lvl2pPr>
+            <a:lvl3pPr marL="914400" algn="l" rtl="0" fontAlgn="base">
+              <a:spcBef>
+                <a:spcPct val="0"/>
+              </a:spcBef>
+              <a:spcAft>
+                <a:spcPct val="0"/>
+              </a:spcAft>
+              <a:defRPr kern="1200">
+                <a:solidFill>
+                  <a:schemeClr val="tx1"/>
+                </a:solidFill>
+                <a:latin typeface="Arial" charset="0"/>
+                <a:ea typeface="ＭＳ Ｐゴシック" charset="0"/>
+                <a:cs typeface="ＭＳ Ｐゴシック" charset="0"/>
+              </a:defRPr>
+            </a:lvl3pPr>
+            <a:lvl4pPr marL="1371600" algn="l" rtl="0" fontAlgn="base">
+              <a:spcBef>
+                <a:spcPct val="0"/>
+              </a:spcBef>
+              <a:spcAft>
+                <a:spcPct val="0"/>
+              </a:spcAft>
+              <a:defRPr kern="1200">
+                <a:solidFill>
+                  <a:schemeClr val="tx1"/>
+                </a:solidFill>
+                <a:latin typeface="Arial" charset="0"/>
+                <a:ea typeface="ＭＳ Ｐゴシック" charset="0"/>
+                <a:cs typeface="ＭＳ Ｐゴシック" charset="0"/>
+              </a:defRPr>
+            </a:lvl4pPr>
+            <a:lvl5pPr marL="1828800" algn="l" rtl="0" fontAlgn="base">
+              <a:spcBef>
+                <a:spcPct val="0"/>
+              </a:spcBef>
+              <a:spcAft>
+                <a:spcPct val="0"/>
+              </a:spcAft>
+              <a:defRPr kern="1200">
+                <a:solidFill>
+                  <a:schemeClr val="tx1"/>
+                </a:solidFill>
+                <a:latin typeface="Arial" charset="0"/>
+                <a:ea typeface="ＭＳ Ｐゴシック" charset="0"/>
+                <a:cs typeface="ＭＳ Ｐゴシック" charset="0"/>
+              </a:defRPr>
+            </a:lvl5pPr>
+            <a:lvl6pPr marL="2286000" algn="l" defTabSz="457200" rtl="0" eaLnBrk="1" latinLnBrk="0" hangingPunct="1">
+              <a:defRPr kern="1200">
+                <a:solidFill>
+                  <a:schemeClr val="tx1"/>
+                </a:solidFill>
+                <a:latin typeface="Arial" charset="0"/>
+                <a:ea typeface="ＭＳ Ｐゴシック" charset="0"/>
+                <a:cs typeface="ＭＳ Ｐゴシック" charset="0"/>
+              </a:defRPr>
+            </a:lvl6pPr>
+            <a:lvl7pPr marL="2743200" algn="l" defTabSz="457200" rtl="0" eaLnBrk="1" latinLnBrk="0" hangingPunct="1">
+              <a:defRPr kern="1200">
+                <a:solidFill>
+                  <a:schemeClr val="tx1"/>
+                </a:solidFill>
+                <a:latin typeface="Arial" charset="0"/>
+                <a:ea typeface="ＭＳ Ｐゴシック" charset="0"/>
+                <a:cs typeface="ＭＳ Ｐゴシック" charset="0"/>
+              </a:defRPr>
+            </a:lvl7pPr>
+            <a:lvl8pPr marL="3200400" algn="l" defTabSz="457200" rtl="0" eaLnBrk="1" latinLnBrk="0" hangingPunct="1">
+              <a:defRPr kern="1200">
+                <a:solidFill>
+                  <a:schemeClr val="tx1"/>
+                </a:solidFill>
+                <a:latin typeface="Arial" charset="0"/>
+                <a:ea typeface="ＭＳ Ｐゴシック" charset="0"/>
+                <a:cs typeface="ＭＳ Ｐゴシック" charset="0"/>
+              </a:defRPr>
+            </a:lvl8pPr>
+            <a:lvl9pPr marL="3657600" algn="l" defTabSz="457200" rtl="0" eaLnBrk="1" latinLnBrk="0" hangingPunct="1">
+              <a:defRPr kern="1200">
+                <a:solidFill>
+                  <a:schemeClr val="tx1"/>
+                </a:solidFill>
+                <a:latin typeface="Arial" charset="0"/>
+                <a:ea typeface="ＭＳ Ｐゴシック" charset="0"/>
+                <a:cs typeface="ＭＳ Ｐゴシック" charset="0"/>
+              </a:defRPr>
+            </a:lvl9pPr>
+          </a:lstStyle>
+          <a:p>
+            <a:pPr>
+              <a:defRPr/>
+            </a:pPr>
+            <a:endParaRPr lang="en-GB" sz="1100">
+              <a:cs typeface="+mn-cs"/>
+            </a:endParaRPr>
+          </a:p>
+        </p:txBody>
+      </p:sp>
+      <p:sp>
+        <p:nvSpPr>
+          <p:cNvPr id="109" name="Rectangle à coins arrondis 131"/>
+          <p:cNvSpPr/>
+          <p:nvPr/>
+        </p:nvSpPr>
+        <p:spPr>
+          <a:xfrm>
+            <a:off x="1912053" y="116633"/>
+            <a:ext cx="5601314" cy="5552803"/>
+          </a:xfrm>
+          <a:prstGeom prst="roundRect">
+            <a:avLst>
+              <a:gd name="adj" fmla="val 12341"/>
+            </a:avLst>
+          </a:prstGeom>
+          <a:solidFill>
+            <a:schemeClr val="accent3">
+              <a:alpha val="41000"/>
+            </a:schemeClr>
+          </a:solidFill>
+          <a:ln>
+            <a:solidFill>
+              <a:schemeClr val="accent3">
+                <a:lumMod val="75000"/>
+              </a:schemeClr>
+            </a:solidFill>
+          </a:ln>
+          <a:effectLst/>
+        </p:spPr>
+        <p:style>
+          <a:lnRef idx="1">
+            <a:schemeClr val="accent1"/>
+          </a:lnRef>
+          <a:fillRef idx="3">
+            <a:schemeClr val="accent1"/>
+          </a:fillRef>
+          <a:effectRef idx="2">
+            <a:schemeClr val="accent1"/>
+          </a:effectRef>
+          <a:fontRef idx="minor">
+            <a:schemeClr val="lt1"/>
+          </a:fontRef>
+        </p:style>
+        <p:txBody>
+          <a:bodyPr rtlCol="0" anchor="ctr"/>
+          <a:lstStyle/>
+          <a:p>
+            <a:pPr algn="ctr"/>
+            <a:endParaRPr lang="en-GB" dirty="0" smtClean="0">
+              <a:solidFill>
+                <a:schemeClr val="bg2">
+                  <a:lumMod val="25000"/>
+                </a:schemeClr>
+              </a:solidFill>
+              <a:latin typeface="Consolas"/>
+              <a:cs typeface="Consolas"/>
+              <a:sym typeface="Symbol" charset="0"/>
+            </a:endParaRPr>
+          </a:p>
+          <a:p>
+            <a:pPr algn="ctr"/>
+            <a:r>
+              <a:rPr lang="en-GB" dirty="0" smtClean="0">
+                <a:solidFill>
+                  <a:schemeClr val="bg2">
+                    <a:lumMod val="25000"/>
+                  </a:schemeClr>
+                </a:solidFill>
+                <a:latin typeface="Consolas"/>
+                <a:cs typeface="Consolas"/>
+                <a:sym typeface="Symbol" charset="0"/>
+              </a:rPr>
+              <a:t></a:t>
+            </a:r>
+            <a:r>
+              <a:rPr lang="es-MX" dirty="0" smtClean="0">
+                <a:solidFill>
+                  <a:schemeClr val="bg2">
+                    <a:lumMod val="25000"/>
+                  </a:schemeClr>
+                </a:solidFill>
+              </a:rPr>
+              <a:t>SOD-M</a:t>
+            </a:r>
+          </a:p>
+          <a:p>
+            <a:pPr algn="ctr"/>
+            <a:endParaRPr lang="es-MX" dirty="0">
+              <a:solidFill>
+                <a:schemeClr val="bg2">
+                  <a:lumMod val="25000"/>
+                </a:schemeClr>
+              </a:solidFill>
+            </a:endParaRPr>
+          </a:p>
+          <a:p>
+            <a:pPr algn="ctr"/>
+            <a:endParaRPr lang="es-MX" dirty="0" smtClean="0">
+              <a:solidFill>
+                <a:schemeClr val="bg2">
+                  <a:lumMod val="25000"/>
+                </a:schemeClr>
+              </a:solidFill>
+            </a:endParaRPr>
+          </a:p>
+          <a:p>
+            <a:pPr algn="ctr"/>
+            <a:endParaRPr lang="es-MX" dirty="0">
+              <a:solidFill>
+                <a:schemeClr val="bg2">
+                  <a:lumMod val="25000"/>
+                </a:schemeClr>
+              </a:solidFill>
+            </a:endParaRPr>
+          </a:p>
+          <a:p>
+            <a:pPr algn="ctr"/>
+            <a:endParaRPr lang="es-MX" dirty="0" smtClean="0">
+              <a:solidFill>
+                <a:schemeClr val="bg2">
+                  <a:lumMod val="25000"/>
+                </a:schemeClr>
+              </a:solidFill>
+            </a:endParaRPr>
+          </a:p>
+          <a:p>
+            <a:pPr algn="ctr"/>
+            <a:endParaRPr lang="es-MX" dirty="0" smtClean="0">
+              <a:solidFill>
+                <a:schemeClr val="bg2">
+                  <a:lumMod val="25000"/>
+                </a:schemeClr>
+              </a:solidFill>
+            </a:endParaRPr>
+          </a:p>
+          <a:p>
+            <a:pPr algn="ctr"/>
+            <a:endParaRPr lang="es-MX" dirty="0">
+              <a:solidFill>
+                <a:schemeClr val="bg2">
+                  <a:lumMod val="25000"/>
+                </a:schemeClr>
+              </a:solidFill>
+            </a:endParaRPr>
+          </a:p>
+          <a:p>
+            <a:pPr algn="ctr"/>
+            <a:endParaRPr lang="es-MX" dirty="0" smtClean="0">
+              <a:solidFill>
+                <a:schemeClr val="bg2">
+                  <a:lumMod val="25000"/>
+                </a:schemeClr>
+              </a:solidFill>
+            </a:endParaRPr>
+          </a:p>
+          <a:p>
+            <a:pPr algn="ctr"/>
+            <a:endParaRPr lang="es-MX" dirty="0" smtClean="0">
+              <a:solidFill>
+                <a:srgbClr val="7F7F7F"/>
+              </a:solidFill>
+            </a:endParaRPr>
+          </a:p>
+          <a:p>
+            <a:pPr algn="ctr"/>
+            <a:endParaRPr lang="es-MX" dirty="0" smtClean="0">
+              <a:solidFill>
+                <a:srgbClr val="7F7F7F"/>
+              </a:solidFill>
+            </a:endParaRPr>
+          </a:p>
+          <a:p>
+            <a:pPr algn="ctr"/>
+            <a:endParaRPr lang="es-MX" dirty="0">
+              <a:solidFill>
+                <a:srgbClr val="7F7F7F"/>
+              </a:solidFill>
+            </a:endParaRPr>
+          </a:p>
+          <a:p>
+            <a:pPr algn="ctr"/>
+            <a:endParaRPr lang="es-MX" dirty="0" smtClean="0">
+              <a:solidFill>
+                <a:srgbClr val="7F7F7F"/>
+              </a:solidFill>
+            </a:endParaRPr>
+          </a:p>
+          <a:p>
+            <a:pPr algn="ctr"/>
+            <a:endParaRPr lang="es-MX" dirty="0" smtClean="0">
+              <a:solidFill>
+                <a:srgbClr val="7F7F7F"/>
+              </a:solidFill>
+            </a:endParaRPr>
+          </a:p>
+          <a:p>
+            <a:pPr algn="ctr"/>
+            <a:endParaRPr lang="es-MX" dirty="0" smtClean="0">
+              <a:solidFill>
+                <a:srgbClr val="7F7F7F"/>
+              </a:solidFill>
+            </a:endParaRPr>
+          </a:p>
+          <a:p>
+            <a:pPr algn="ctr"/>
+            <a:endParaRPr lang="es-MX" dirty="0" smtClean="0">
+              <a:solidFill>
+                <a:srgbClr val="7F7F7F"/>
+              </a:solidFill>
+            </a:endParaRPr>
+          </a:p>
+          <a:p>
+            <a:pPr algn="ctr"/>
+            <a:endParaRPr lang="es-MX" dirty="0" smtClean="0">
+              <a:solidFill>
+                <a:srgbClr val="7F7F7F"/>
+              </a:solidFill>
+            </a:endParaRPr>
+          </a:p>
+          <a:p>
+            <a:pPr algn="ctr"/>
+            <a:endParaRPr lang="es-MX" dirty="0" smtClean="0">
+              <a:solidFill>
+                <a:srgbClr val="7F7F7F"/>
+              </a:solidFill>
+            </a:endParaRPr>
+          </a:p>
+          <a:p>
+            <a:pPr algn="ctr"/>
+            <a:endParaRPr lang="es-MX" dirty="0" smtClean="0">
+              <a:solidFill>
+                <a:srgbClr val="7F7F7F"/>
+              </a:solidFill>
+            </a:endParaRPr>
+          </a:p>
+          <a:p>
+            <a:pPr algn="ctr"/>
+            <a:endParaRPr lang="es-MX" dirty="0" smtClean="0">
+              <a:solidFill>
+                <a:srgbClr val="7F7F7F"/>
+              </a:solidFill>
+            </a:endParaRPr>
+          </a:p>
+          <a:p>
+            <a:pPr algn="ctr"/>
+            <a:endParaRPr lang="es-MX" dirty="0" smtClean="0">
+              <a:solidFill>
+                <a:srgbClr val="7F7F7F"/>
+              </a:solidFill>
+            </a:endParaRPr>
+          </a:p>
+          <a:p>
+            <a:pPr algn="ctr"/>
+            <a:endParaRPr lang="es-MX" dirty="0">
+              <a:solidFill>
+                <a:srgbClr val="7F7F7F"/>
+              </a:solidFill>
             </a:endParaRPr>
           </a:p>
         </p:txBody>
@@ -7923,7 +8056,7 @@
         </p:nvGrpSpPr>
         <p:grpSpPr>
           <a:xfrm>
-            <a:off x="5605931" y="4836582"/>
+            <a:off x="5580112" y="4836582"/>
             <a:ext cx="1575779" cy="645443"/>
             <a:chOff x="6194341" y="4099865"/>
             <a:chExt cx="1620748" cy="524866"/>
@@ -9097,182 +9230,6 @@
       </p:sp>
       <p:sp>
         <p:nvSpPr>
-          <p:cNvPr id="137" name="AutoShape 21"/>
-          <p:cNvSpPr>
-            <a:spLocks noChangeArrowheads="1"/>
-          </p:cNvSpPr>
-          <p:nvPr/>
-        </p:nvSpPr>
-        <p:spPr bwMode="auto">
-          <a:xfrm>
-            <a:off x="6274889" y="5643492"/>
-            <a:ext cx="515309" cy="354746"/>
-          </a:xfrm>
-          <a:prstGeom prst="downArrow">
-            <a:avLst>
-              <a:gd name="adj1" fmla="val 49778"/>
-              <a:gd name="adj2" fmla="val 39009"/>
-            </a:avLst>
-          </a:prstGeom>
-          <a:solidFill>
-            <a:schemeClr val="accent3">
-              <a:lumMod val="50000"/>
-              <a:alpha val="72000"/>
-            </a:schemeClr>
-          </a:solidFill>
-          <a:ln w="12700" cmpd="sng">
-            <a:solidFill>
-              <a:schemeClr val="accent3">
-                <a:lumMod val="60000"/>
-                <a:lumOff val="40000"/>
-              </a:schemeClr>
-            </a:solidFill>
-            <a:miter lim="800000"/>
-            <a:headEnd/>
-            <a:tailEnd/>
-          </a:ln>
-          <a:effectLst/>
-          <a:extLst/>
-        </p:spPr>
-        <p:txBody>
-          <a:bodyPr wrap="none" anchor="ctr"/>
-          <a:lstStyle>
-            <a:defPPr>
-              <a:defRPr lang="es-ES"/>
-            </a:defPPr>
-            <a:lvl1pPr algn="l" rtl="0" fontAlgn="base">
-              <a:spcBef>
-                <a:spcPct val="0"/>
-              </a:spcBef>
-              <a:spcAft>
-                <a:spcPct val="0"/>
-              </a:spcAft>
-              <a:defRPr kern="1200">
-                <a:solidFill>
-                  <a:schemeClr val="tx1"/>
-                </a:solidFill>
-                <a:latin typeface="Arial" charset="0"/>
-                <a:ea typeface="ＭＳ Ｐゴシック" charset="0"/>
-                <a:cs typeface="ＭＳ Ｐゴシック" charset="0"/>
-              </a:defRPr>
-            </a:lvl1pPr>
-            <a:lvl2pPr marL="457200" algn="l" rtl="0" fontAlgn="base">
-              <a:spcBef>
-                <a:spcPct val="0"/>
-              </a:spcBef>
-              <a:spcAft>
-                <a:spcPct val="0"/>
-              </a:spcAft>
-              <a:defRPr kern="1200">
-                <a:solidFill>
-                  <a:schemeClr val="tx1"/>
-                </a:solidFill>
-                <a:latin typeface="Arial" charset="0"/>
-                <a:ea typeface="ＭＳ Ｐゴシック" charset="0"/>
-                <a:cs typeface="ＭＳ Ｐゴシック" charset="0"/>
-              </a:defRPr>
-            </a:lvl2pPr>
-            <a:lvl3pPr marL="914400" algn="l" rtl="0" fontAlgn="base">
-              <a:spcBef>
-                <a:spcPct val="0"/>
-              </a:spcBef>
-              <a:spcAft>
-                <a:spcPct val="0"/>
-              </a:spcAft>
-              <a:defRPr kern="1200">
-                <a:solidFill>
-                  <a:schemeClr val="tx1"/>
-                </a:solidFill>
-                <a:latin typeface="Arial" charset="0"/>
-                <a:ea typeface="ＭＳ Ｐゴシック" charset="0"/>
-                <a:cs typeface="ＭＳ Ｐゴシック" charset="0"/>
-              </a:defRPr>
-            </a:lvl3pPr>
-            <a:lvl4pPr marL="1371600" algn="l" rtl="0" fontAlgn="base">
-              <a:spcBef>
-                <a:spcPct val="0"/>
-              </a:spcBef>
-              <a:spcAft>
-                <a:spcPct val="0"/>
-              </a:spcAft>
-              <a:defRPr kern="1200">
-                <a:solidFill>
-                  <a:schemeClr val="tx1"/>
-                </a:solidFill>
-                <a:latin typeface="Arial" charset="0"/>
-                <a:ea typeface="ＭＳ Ｐゴシック" charset="0"/>
-                <a:cs typeface="ＭＳ Ｐゴシック" charset="0"/>
-              </a:defRPr>
-            </a:lvl4pPr>
-            <a:lvl5pPr marL="1828800" algn="l" rtl="0" fontAlgn="base">
-              <a:spcBef>
-                <a:spcPct val="0"/>
-              </a:spcBef>
-              <a:spcAft>
-                <a:spcPct val="0"/>
-              </a:spcAft>
-              <a:defRPr kern="1200">
-                <a:solidFill>
-                  <a:schemeClr val="tx1"/>
-                </a:solidFill>
-                <a:latin typeface="Arial" charset="0"/>
-                <a:ea typeface="ＭＳ Ｐゴシック" charset="0"/>
-                <a:cs typeface="ＭＳ Ｐゴシック" charset="0"/>
-              </a:defRPr>
-            </a:lvl5pPr>
-            <a:lvl6pPr marL="2286000" algn="l" defTabSz="457200" rtl="0" eaLnBrk="1" latinLnBrk="0" hangingPunct="1">
-              <a:defRPr kern="1200">
-                <a:solidFill>
-                  <a:schemeClr val="tx1"/>
-                </a:solidFill>
-                <a:latin typeface="Arial" charset="0"/>
-                <a:ea typeface="ＭＳ Ｐゴシック" charset="0"/>
-                <a:cs typeface="ＭＳ Ｐゴシック" charset="0"/>
-              </a:defRPr>
-            </a:lvl6pPr>
-            <a:lvl7pPr marL="2743200" algn="l" defTabSz="457200" rtl="0" eaLnBrk="1" latinLnBrk="0" hangingPunct="1">
-              <a:defRPr kern="1200">
-                <a:solidFill>
-                  <a:schemeClr val="tx1"/>
-                </a:solidFill>
-                <a:latin typeface="Arial" charset="0"/>
-                <a:ea typeface="ＭＳ Ｐゴシック" charset="0"/>
-                <a:cs typeface="ＭＳ Ｐゴシック" charset="0"/>
-              </a:defRPr>
-            </a:lvl7pPr>
-            <a:lvl8pPr marL="3200400" algn="l" defTabSz="457200" rtl="0" eaLnBrk="1" latinLnBrk="0" hangingPunct="1">
-              <a:defRPr kern="1200">
-                <a:solidFill>
-                  <a:schemeClr val="tx1"/>
-                </a:solidFill>
-                <a:latin typeface="Arial" charset="0"/>
-                <a:ea typeface="ＭＳ Ｐゴシック" charset="0"/>
-                <a:cs typeface="ＭＳ Ｐゴシック" charset="0"/>
-              </a:defRPr>
-            </a:lvl8pPr>
-            <a:lvl9pPr marL="3657600" algn="l" defTabSz="457200" rtl="0" eaLnBrk="1" latinLnBrk="0" hangingPunct="1">
-              <a:defRPr kern="1200">
-                <a:solidFill>
-                  <a:schemeClr val="tx1"/>
-                </a:solidFill>
-                <a:latin typeface="Arial" charset="0"/>
-                <a:ea typeface="ＭＳ Ｐゴシック" charset="0"/>
-                <a:cs typeface="ＭＳ Ｐゴシック" charset="0"/>
-              </a:defRPr>
-            </a:lvl9pPr>
-          </a:lstStyle>
-          <a:p>
-            <a:pPr>
-              <a:defRPr/>
-            </a:pPr>
-            <a:endParaRPr lang="en-GB" sz="1100">
-              <a:cs typeface="+mn-cs"/>
-            </a:endParaRPr>
-          </a:p>
-        </p:txBody>
-      </p:sp>
-      <p:sp>
-        <p:nvSpPr>
           <p:cNvPr id="138" name="TextBox 44"/>
           <p:cNvSpPr txBox="1"/>
           <p:nvPr/>
@@ -9987,15 +9944,15 @@
                 <a:defRPr/>
               </a:pPr>
               <a:r>
-                <a:rPr lang="en-GB" sz="1200" dirty="0" smtClean="0">
+                <a:rPr lang="en-US" sz="1200" dirty="0">
                   <a:latin typeface="Consolas"/>
                   <a:cs typeface="Consolas"/>
                   <a:sym typeface="Symbol" charset="0"/>
                 </a:rPr>
-                <a:t>e</a:t>
+                <a:t>E</a:t>
               </a:r>
               <a:r>
-                <a:rPr lang="en-GB" sz="1200" baseline="30000" dirty="0" smtClean="0">
+                <a:rPr lang="en-GB" sz="1200" baseline="30000" dirty="0">
                   <a:latin typeface="Consolas"/>
                   <a:cs typeface="Consolas"/>
                   <a:sym typeface="Symbol" charset="0"/>
@@ -10448,7 +10405,7 @@
                   <a:latin typeface="Consolas"/>
                   <a:cs typeface="Consolas"/>
                 </a:rPr>
-                <a:t>Meta-Model</a:t>
+                <a:t>Model</a:t>
               </a:r>
               <a:endParaRPr lang="en-GB" sz="1100" dirty="0">
                 <a:latin typeface="Consolas"/>
@@ -10839,12 +10796,12 @@
                 <a:defRPr/>
               </a:pPr>
               <a:r>
-                <a:rPr lang="en-GB" sz="1100" dirty="0" smtClean="0">
+                <a:rPr lang="en-US" sz="1100" dirty="0" smtClean="0">
                   <a:latin typeface="Consolas"/>
                   <a:cs typeface="Consolas"/>
                   <a:sym typeface="Symbol" charset="0"/>
                 </a:rPr>
-                <a:t>e</a:t>
+                <a:t>E</a:t>
               </a:r>
               <a:r>
                 <a:rPr lang="en-GB" sz="1100" baseline="30000" dirty="0" smtClean="0">
@@ -10881,7 +10838,7 @@
                   <a:latin typeface="Consolas"/>
                   <a:cs typeface="Consolas"/>
                 </a:rPr>
-                <a:t>Meta-Model</a:t>
+                <a:t>Model</a:t>
               </a:r>
               <a:endParaRPr lang="en-GB" sz="1100" dirty="0">
                 <a:latin typeface="Consolas"/>

</xml_diff>